<commit_message>
Sequence Diagram PPT fixes
</commit_message>
<xml_diff>
--- a/docs/diagrams/FilterSequenceDiagram.pptx
+++ b/docs/diagrams/FilterSequenceDiagram.pptx
@@ -209,7 +209,7 @@
           <a:p>
             <a:fld id="{F5CC4B3F-88C1-4FFA-B1B6-F41C21DC6924}" type="datetimeFigureOut">
               <a:rPr lang="en-US" smtClean="0"/>
-              <a:t>11/10/18</a:t>
+              <a:t>11/11/18</a:t>
             </a:fld>
             <a:endParaRPr lang="en-US"/>
           </a:p>
@@ -476,6 +476,90 @@
 </p:notesMaster>
 </file>
 
+<file path=ppt/notesSlides/notesSlide1.xml><?xml version="1.0" encoding="utf-8"?>
+<p:notes xmlns:a="http://schemas.openxmlformats.org/drawingml/2006/main" xmlns:r="http://schemas.openxmlformats.org/officeDocument/2006/relationships" xmlns:p="http://schemas.openxmlformats.org/presentationml/2006/main">
+  <p:cSld>
+    <p:spTree>
+      <p:nvGrpSpPr>
+        <p:cNvPr id="1" name=""/>
+        <p:cNvGrpSpPr/>
+        <p:nvPr/>
+      </p:nvGrpSpPr>
+      <p:grpSpPr>
+        <a:xfrm>
+          <a:off x="0" y="0"/>
+          <a:ext cx="0" cy="0"/>
+          <a:chOff x="0" y="0"/>
+          <a:chExt cx="0" cy="0"/>
+        </a:xfrm>
+      </p:grpSpPr>
+      <p:sp>
+        <p:nvSpPr>
+          <p:cNvPr id="2" name="Slide Image Placeholder 1"/>
+          <p:cNvSpPr>
+            <a:spLocks noGrp="1" noRot="1" noChangeAspect="1"/>
+          </p:cNvSpPr>
+          <p:nvPr>
+            <p:ph type="sldImg"/>
+          </p:nvPr>
+        </p:nvSpPr>
+        <p:spPr/>
+      </p:sp>
+      <p:sp>
+        <p:nvSpPr>
+          <p:cNvPr id="3" name="Notes Placeholder 2"/>
+          <p:cNvSpPr>
+            <a:spLocks noGrp="1"/>
+          </p:cNvSpPr>
+          <p:nvPr>
+            <p:ph type="body" idx="1"/>
+          </p:nvPr>
+        </p:nvSpPr>
+        <p:spPr/>
+        <p:txBody>
+          <a:bodyPr/>
+          <a:lstStyle/>
+          <a:p>
+            <a:endParaRPr lang="en-US" dirty="0"/>
+          </a:p>
+        </p:txBody>
+      </p:sp>
+      <p:sp>
+        <p:nvSpPr>
+          <p:cNvPr id="4" name="Slide Number Placeholder 3"/>
+          <p:cNvSpPr>
+            <a:spLocks noGrp="1"/>
+          </p:cNvSpPr>
+          <p:nvPr>
+            <p:ph type="sldNum" sz="quarter" idx="5"/>
+          </p:nvPr>
+        </p:nvSpPr>
+        <p:spPr/>
+        <p:txBody>
+          <a:bodyPr/>
+          <a:lstStyle/>
+          <a:p>
+            <a:fld id="{5A7AB025-77E3-4BD1-A2FD-B3183DBA47A3}" type="slidenum">
+              <a:rPr lang="en-US" smtClean="0"/>
+              <a:t>1</a:t>
+            </a:fld>
+            <a:endParaRPr lang="en-US"/>
+          </a:p>
+        </p:txBody>
+      </p:sp>
+    </p:spTree>
+    <p:extLst>
+      <p:ext uri="{BB962C8B-B14F-4D97-AF65-F5344CB8AC3E}">
+        <p14:creationId xmlns:p14="http://schemas.microsoft.com/office/powerpoint/2010/main" val="3494375260"/>
+      </p:ext>
+    </p:extLst>
+  </p:cSld>
+  <p:clrMapOvr>
+    <a:masterClrMapping/>
+  </p:clrMapOvr>
+</p:notes>
+</file>
+
 <file path=ppt/slideLayouts/slideLayout1.xml><?xml version="1.0" encoding="utf-8"?>
 <p:sldLayout xmlns:a="http://schemas.openxmlformats.org/drawingml/2006/main" xmlns:r="http://schemas.openxmlformats.org/officeDocument/2006/relationships" xmlns:p="http://schemas.openxmlformats.org/presentationml/2006/main" type="title" preserve="1">
   <p:cSld name="Title Slide">
@@ -655,7 +739,7 @@
           <a:p>
             <a:fld id="{78C97017-6FC3-485B-9764-EAC9E56C1D49}" type="datetimeFigureOut">
               <a:rPr lang="en-US" smtClean="0"/>
-              <a:t>11/10/18</a:t>
+              <a:t>11/11/18</a:t>
             </a:fld>
             <a:endParaRPr lang="en-US"/>
           </a:p>
@@ -823,7 +907,7 @@
           <a:p>
             <a:fld id="{78C97017-6FC3-485B-9764-EAC9E56C1D49}" type="datetimeFigureOut">
               <a:rPr lang="en-US" smtClean="0"/>
-              <a:t>11/10/18</a:t>
+              <a:t>11/11/18</a:t>
             </a:fld>
             <a:endParaRPr lang="en-US"/>
           </a:p>
@@ -1001,7 +1085,7 @@
           <a:p>
             <a:fld id="{78C97017-6FC3-485B-9764-EAC9E56C1D49}" type="datetimeFigureOut">
               <a:rPr lang="en-US" smtClean="0"/>
-              <a:t>11/10/18</a:t>
+              <a:t>11/11/18</a:t>
             </a:fld>
             <a:endParaRPr lang="en-US"/>
           </a:p>
@@ -1169,7 +1253,7 @@
           <a:p>
             <a:fld id="{78C97017-6FC3-485B-9764-EAC9E56C1D49}" type="datetimeFigureOut">
               <a:rPr lang="en-US" smtClean="0"/>
-              <a:t>11/10/18</a:t>
+              <a:t>11/11/18</a:t>
             </a:fld>
             <a:endParaRPr lang="en-US"/>
           </a:p>
@@ -1414,7 +1498,7 @@
           <a:p>
             <a:fld id="{78C97017-6FC3-485B-9764-EAC9E56C1D49}" type="datetimeFigureOut">
               <a:rPr lang="en-US" smtClean="0"/>
-              <a:t>11/10/18</a:t>
+              <a:t>11/11/18</a:t>
             </a:fld>
             <a:endParaRPr lang="en-US"/>
           </a:p>
@@ -1699,7 +1783,7 @@
           <a:p>
             <a:fld id="{78C97017-6FC3-485B-9764-EAC9E56C1D49}" type="datetimeFigureOut">
               <a:rPr lang="en-US" smtClean="0"/>
-              <a:t>11/10/18</a:t>
+              <a:t>11/11/18</a:t>
             </a:fld>
             <a:endParaRPr lang="en-US"/>
           </a:p>
@@ -2118,7 +2202,7 @@
           <a:p>
             <a:fld id="{78C97017-6FC3-485B-9764-EAC9E56C1D49}" type="datetimeFigureOut">
               <a:rPr lang="en-US" smtClean="0"/>
-              <a:t>11/10/18</a:t>
+              <a:t>11/11/18</a:t>
             </a:fld>
             <a:endParaRPr lang="en-US"/>
           </a:p>
@@ -2235,7 +2319,7 @@
           <a:p>
             <a:fld id="{78C97017-6FC3-485B-9764-EAC9E56C1D49}" type="datetimeFigureOut">
               <a:rPr lang="en-US" smtClean="0"/>
-              <a:t>11/10/18</a:t>
+              <a:t>11/11/18</a:t>
             </a:fld>
             <a:endParaRPr lang="en-US"/>
           </a:p>
@@ -2330,7 +2414,7 @@
           <a:p>
             <a:fld id="{78C97017-6FC3-485B-9764-EAC9E56C1D49}" type="datetimeFigureOut">
               <a:rPr lang="en-US" smtClean="0"/>
-              <a:t>11/10/18</a:t>
+              <a:t>11/11/18</a:t>
             </a:fld>
             <a:endParaRPr lang="en-US"/>
           </a:p>
@@ -2605,7 +2689,7 @@
           <a:p>
             <a:fld id="{78C97017-6FC3-485B-9764-EAC9E56C1D49}" type="datetimeFigureOut">
               <a:rPr lang="en-US" smtClean="0"/>
-              <a:t>11/10/18</a:t>
+              <a:t>11/11/18</a:t>
             </a:fld>
             <a:endParaRPr lang="en-US"/>
           </a:p>
@@ -2857,7 +2941,7 @@
           <a:p>
             <a:fld id="{78C97017-6FC3-485B-9764-EAC9E56C1D49}" type="datetimeFigureOut">
               <a:rPr lang="en-US" smtClean="0"/>
-              <a:t>11/10/18</a:t>
+              <a:t>11/11/18</a:t>
             </a:fld>
             <a:endParaRPr lang="en-US"/>
           </a:p>
@@ -3068,7 +3152,7 @@
           <a:p>
             <a:fld id="{78C97017-6FC3-485B-9764-EAC9E56C1D49}" type="datetimeFigureOut">
               <a:rPr lang="en-US" smtClean="0"/>
-              <a:t>11/10/18</a:t>
+              <a:t>11/11/18</a:t>
             </a:fld>
             <a:endParaRPr lang="en-US"/>
           </a:p>
@@ -3981,7 +4065,7 @@
         </p:nvCxnSpPr>
         <p:spPr>
           <a:xfrm>
-            <a:off x="198315" y="1338199"/>
+            <a:off x="180319" y="1447800"/>
             <a:ext cx="1137846" cy="0"/>
           </a:xfrm>
           <a:prstGeom prst="straightConnector1">
@@ -4017,7 +4101,7 @@
         </p:nvSpPr>
         <p:spPr>
           <a:xfrm>
-            <a:off x="-37906" y="1072170"/>
+            <a:off x="-81553" y="1262276"/>
             <a:ext cx="1447743" cy="169277"/>
           </a:xfrm>
           <a:prstGeom prst="rect">
@@ -4038,7 +4122,23 @@
                   <a:srgbClr val="0070C0"/>
                 </a:solidFill>
               </a:rPr>
-              <a:t>execute(“filter ”)</a:t>
+              <a:t>execute(“filter </a:t>
+            </a:r>
+            <a:r>
+              <a:rPr lang="en-US" sz="1100" dirty="0" err="1">
+                <a:solidFill>
+                  <a:srgbClr val="0070C0"/>
+                </a:solidFill>
+              </a:rPr>
+              <a:t>args</a:t>
+            </a:r>
+            <a:r>
+              <a:rPr lang="en-US" sz="1100" dirty="0">
+                <a:solidFill>
+                  <a:srgbClr val="0070C0"/>
+                </a:solidFill>
+              </a:rPr>
+              <a:t>”)</a:t>
             </a:r>
           </a:p>
         </p:txBody>
@@ -4296,7 +4396,7 @@
         </p:nvSpPr>
         <p:spPr>
           <a:xfrm>
-            <a:off x="5336575" y="2677140"/>
+            <a:off x="5257800" y="2692569"/>
             <a:ext cx="1870824" cy="507831"/>
           </a:xfrm>
           <a:prstGeom prst="rect">
@@ -4391,8 +4491,8 @@
         </p:nvSpPr>
         <p:spPr>
           <a:xfrm>
-            <a:off x="1393756" y="1225699"/>
-            <a:ext cx="1564084" cy="169277"/>
+            <a:off x="1436696" y="1224314"/>
+            <a:ext cx="1681540" cy="169277"/>
           </a:xfrm>
           <a:prstGeom prst="rect">
             <a:avLst/>
@@ -4422,7 +4522,15 @@
             </a:r>
             <a:r>
               <a:rPr lang="en-US" sz="1100" dirty="0"/>
-              <a:t>(“filter”)</a:t>
+              <a:t>(“filter </a:t>
+            </a:r>
+            <a:r>
+              <a:rPr lang="en-US" sz="1100" dirty="0" err="1"/>
+              <a:t>args</a:t>
+            </a:r>
+            <a:r>
+              <a:rPr lang="en-US" sz="1100" dirty="0"/>
+              <a:t>”)</a:t>
             </a:r>
           </a:p>
         </p:txBody>

</xml_diff>